<commit_message>
updates from 04/12/2021 class
</commit_message>
<xml_diff>
--- a/00_Classes/04_12_Monday/Cody_CH12.pptx
+++ b/00_Classes/04_12_Monday/Cody_CH12.pptx
@@ -5,7 +5,7 @@
     <p:sldMasterId id="2147483648" r:id="rId1"/>
   </p:sldMasterIdLst>
   <p:notesMasterIdLst>
-    <p:notesMasterId r:id="rId23"/>
+    <p:notesMasterId r:id="rId25"/>
   </p:notesMasterIdLst>
   <p:sldIdLst>
     <p:sldId id="256" r:id="rId2"/>
@@ -28,7 +28,9 @@
     <p:sldId id="317" r:id="rId19"/>
     <p:sldId id="318" r:id="rId20"/>
     <p:sldId id="319" r:id="rId21"/>
-    <p:sldId id="274" r:id="rId22"/>
+    <p:sldId id="320" r:id="rId22"/>
+    <p:sldId id="321" r:id="rId23"/>
+    <p:sldId id="274" r:id="rId24"/>
   </p:sldIdLst>
   <p:sldSz cx="9144000" cy="5143500" type="screen16x9"/>
   <p:notesSz cx="6858000" cy="9144000"/>
@@ -277,7 +279,7 @@
       </p15:sldGuideLst>
     </p:ext>
     <p:ext uri="http://customooxmlschemas.google.com/">
-      <go:slidesCustomData xmlns="" xmlns:mc="http://schemas.openxmlformats.org/markup-compatibility/2006" xmlns:mv="urn:schemas-microsoft-com:mac:vml" xmlns:c="http://schemas.openxmlformats.org/drawingml/2006/chart" xmlns:dgm="http://schemas.openxmlformats.org/drawingml/2006/diagram" xmlns:o="urn:schemas-microsoft-com:office:office" xmlns:v="urn:schemas-microsoft-com:vml" xmlns:pvml="urn:schemas-microsoft-com:office:powerpoint" xmlns:com="http://schemas.openxmlformats.org/drawingml/2006/compatibility" xmlns:p14="http://schemas.microsoft.com/office/powerpoint/2010/main" xmlns:p15="http://schemas.microsoft.com/office/powerpoint/2012/main" xmlns:ahyp="http://schemas.microsoft.com/office/drawing/2018/hyperlinkcolor" xmlns:go="http://customooxmlschemas.google.com/" r:id="rId26" roundtripDataSignature="AMtx7miyBI51rv9pNb64Xu8q6DJgObo3Wg=="/>
+      <go:slidesCustomData xmlns:go="http://customooxmlschemas.google.com/" xmlns:ahyp="http://schemas.microsoft.com/office/drawing/2018/hyperlinkcolor" xmlns:p15="http://schemas.microsoft.com/office/powerpoint/2012/main" xmlns:p14="http://schemas.microsoft.com/office/powerpoint/2010/main" xmlns:com="http://schemas.openxmlformats.org/drawingml/2006/compatibility" xmlns:pvml="urn:schemas-microsoft-com:office:powerpoint" xmlns:v="urn:schemas-microsoft-com:vml" xmlns:o="urn:schemas-microsoft-com:office:office" xmlns:dgm="http://schemas.openxmlformats.org/drawingml/2006/diagram" xmlns:c="http://schemas.openxmlformats.org/drawingml/2006/chart" xmlns:mv="urn:schemas-microsoft-com:mac:vml" xmlns:mc="http://schemas.openxmlformats.org/markup-compatibility/2006" xmlns="" r:id="rId26" roundtripDataSignature="AMtx7miyBI51rv9pNb64Xu8q6DJgObo3Wg=="/>
     </p:ext>
   </p:extLst>
 </p:presentation>
@@ -1983,6 +1985,189 @@
 </file>
 
 <file path=ppt/notesSlides/notesSlide14.xml><?xml version="1.0" encoding="utf-8"?>
+<p:notes xmlns:a="http://schemas.openxmlformats.org/drawingml/2006/main" xmlns:r="http://schemas.openxmlformats.org/officeDocument/2006/relationships" xmlns:p="http://schemas.openxmlformats.org/presentationml/2006/main" showMasterSp="0" showMasterPhAnim="0">
+  <p:cSld>
+    <p:spTree>
+      <p:nvGrpSpPr>
+        <p:cNvPr id="1" name="Shape 208"/>
+        <p:cNvGrpSpPr/>
+        <p:nvPr/>
+      </p:nvGrpSpPr>
+      <p:grpSpPr>
+        <a:xfrm>
+          <a:off x="0" y="0"/>
+          <a:ext cx="0" cy="0"/>
+          <a:chOff x="0" y="0"/>
+          <a:chExt cx="0" cy="0"/>
+        </a:xfrm>
+      </p:grpSpPr>
+      <p:sp>
+        <p:nvSpPr>
+          <p:cNvPr id="209" name="Google Shape;209;p7:notes"/>
+          <p:cNvSpPr txBox="1">
+            <a:spLocks noGrp="1"/>
+          </p:cNvSpPr>
+          <p:nvPr>
+            <p:ph type="sldNum" idx="12"/>
+          </p:nvPr>
+        </p:nvSpPr>
+        <p:spPr>
+          <a:xfrm>
+            <a:off x="0" y="0"/>
+            <a:ext cx="3000000" cy="3000000"/>
+          </a:xfrm>
+          <a:prstGeom prst="rect">
+            <a:avLst/>
+          </a:prstGeom>
+          <a:noFill/>
+          <a:ln>
+            <a:noFill/>
+          </a:ln>
+        </p:spPr>
+        <p:txBody>
+          <a:bodyPr spcFirstLastPara="1" wrap="square" lIns="91425" tIns="45700" rIns="91425" bIns="45700" anchor="t" anchorCtr="0">
+            <a:noAutofit/>
+          </a:bodyPr>
+          <a:lstStyle/>
+          <a:p>
+            <a:pPr marL="0" marR="0" lvl="0" indent="0" algn="l" rtl="0">
+              <a:spcBef>
+                <a:spcPts val="0"/>
+              </a:spcBef>
+              <a:spcAft>
+                <a:spcPts val="0"/>
+              </a:spcAft>
+              <a:buNone/>
+            </a:pPr>
+            <a:fld id="{00000000-1234-1234-1234-123412341234}" type="slidenum">
+              <a:rPr lang="en-US" sz="1200">
+                <a:solidFill>
+                  <a:schemeClr val="dk1"/>
+                </a:solidFill>
+                <a:latin typeface="Times New Roman"/>
+                <a:ea typeface="Times New Roman"/>
+                <a:cs typeface="Times New Roman"/>
+                <a:sym typeface="Times New Roman"/>
+              </a:rPr>
+              <a:t>21</a:t>
+            </a:fld>
+            <a:endParaRPr sz="1200" dirty="0">
+              <a:solidFill>
+                <a:schemeClr val="dk1"/>
+              </a:solidFill>
+              <a:latin typeface="Times New Roman"/>
+              <a:ea typeface="Times New Roman"/>
+              <a:cs typeface="Times New Roman"/>
+              <a:sym typeface="Times New Roman"/>
+            </a:endParaRPr>
+          </a:p>
+        </p:txBody>
+      </p:sp>
+      <p:sp>
+        <p:nvSpPr>
+          <p:cNvPr id="210" name="Google Shape;210;p7:notes"/>
+          <p:cNvSpPr>
+            <a:spLocks noGrp="1" noRot="1" noChangeAspect="1"/>
+          </p:cNvSpPr>
+          <p:nvPr>
+            <p:ph type="sldImg" idx="2"/>
+          </p:nvPr>
+        </p:nvSpPr>
+        <p:spPr>
+          <a:xfrm>
+            <a:off x="641350" y="1162050"/>
+            <a:ext cx="5575300" cy="3135313"/>
+          </a:xfrm>
+          <a:custGeom>
+            <a:avLst/>
+            <a:gdLst/>
+            <a:ahLst/>
+            <a:cxnLst/>
+            <a:rect l="l" t="t" r="r" b="b"/>
+            <a:pathLst>
+              <a:path w="120000" h="120000" extrusionOk="0">
+                <a:moveTo>
+                  <a:pt x="0" y="0"/>
+                </a:moveTo>
+                <a:lnTo>
+                  <a:pt x="120000" y="0"/>
+                </a:lnTo>
+                <a:lnTo>
+                  <a:pt x="120000" y="120000"/>
+                </a:lnTo>
+                <a:lnTo>
+                  <a:pt x="0" y="120000"/>
+                </a:lnTo>
+                <a:close/>
+              </a:path>
+            </a:pathLst>
+          </a:custGeom>
+          <a:noFill/>
+          <a:ln>
+            <a:noFill/>
+          </a:ln>
+        </p:spPr>
+      </p:sp>
+      <p:sp>
+        <p:nvSpPr>
+          <p:cNvPr id="211" name="Google Shape;211;p7:notes"/>
+          <p:cNvSpPr txBox="1">
+            <a:spLocks noGrp="1"/>
+          </p:cNvSpPr>
+          <p:nvPr>
+            <p:ph type="body" idx="1"/>
+          </p:nvPr>
+        </p:nvSpPr>
+        <p:spPr>
+          <a:xfrm>
+            <a:off x="635508" y="4471416"/>
+            <a:ext cx="5586984" cy="4105656"/>
+          </a:xfrm>
+          <a:prstGeom prst="rect">
+            <a:avLst/>
+          </a:prstGeom>
+          <a:noFill/>
+          <a:ln>
+            <a:noFill/>
+          </a:ln>
+        </p:spPr>
+        <p:txBody>
+          <a:bodyPr spcFirstLastPara="1" wrap="square" lIns="45700" tIns="45700" rIns="45700" bIns="45700" anchor="t" anchorCtr="0">
+            <a:normAutofit/>
+          </a:bodyPr>
+          <a:lstStyle/>
+          <a:p>
+            <a:pPr marL="0" lvl="0" indent="0" algn="l" rtl="0">
+              <a:spcBef>
+                <a:spcPts val="0"/>
+              </a:spcBef>
+              <a:spcAft>
+                <a:spcPts val="0"/>
+              </a:spcAft>
+              <a:buNone/>
+            </a:pPr>
+            <a:r>
+              <a:rPr lang="en-US" dirty="0"/>
+              <a:t>Type answer here</a:t>
+            </a:r>
+            <a:endParaRPr dirty="0"/>
+          </a:p>
+        </p:txBody>
+      </p:sp>
+    </p:spTree>
+    <p:extLst>
+      <p:ext uri="{BB962C8B-B14F-4D97-AF65-F5344CB8AC3E}">
+        <p14:creationId xmlns:p14="http://schemas.microsoft.com/office/powerpoint/2010/main" val="478502958"/>
+      </p:ext>
+    </p:extLst>
+  </p:cSld>
+  <p:clrMapOvr>
+    <a:masterClrMapping/>
+  </p:clrMapOvr>
+</p:notes>
+</file>
+
+<file path=ppt/notesSlides/notesSlide15.xml><?xml version="1.0" encoding="utf-8"?>
 <p:notes xmlns:a="http://schemas.openxmlformats.org/drawingml/2006/main" xmlns:r="http://schemas.openxmlformats.org/officeDocument/2006/relationships" xmlns:p="http://schemas.openxmlformats.org/presentationml/2006/main" showMasterSp="0" showMasterPhAnim="0">
   <p:cSld>
     <p:spTree>
@@ -21944,8 +22129,8 @@
           </a:p>
         </p:txBody>
       </p:sp>
-      <mc:AlternateContent xmlns:mc="http://schemas.openxmlformats.org/markup-compatibility/2006">
-        <mc:Choice xmlns:a14="http://schemas.microsoft.com/office/drawing/2010/main" Requires="a14">
+      <mc:AlternateContent xmlns:mc="http://schemas.openxmlformats.org/markup-compatibility/2006" xmlns:a14="http://schemas.microsoft.com/office/drawing/2010/main">
+        <mc:Choice Requires="a14">
           <p:sp>
             <p:nvSpPr>
               <p:cNvPr id="3" name="Text Placeholder 2">
@@ -22091,7 +22276,7 @@
             </p:txBody>
           </p:sp>
         </mc:Choice>
-        <mc:Fallback>
+        <mc:Fallback xmlns="">
           <p:sp>
             <p:nvSpPr>
               <p:cNvPr id="3" name="Text Placeholder 2">
@@ -23035,6 +23220,559 @@
 </file>
 
 <file path=ppt/slides/slide21.xml><?xml version="1.0" encoding="utf-8"?>
+<p:sld xmlns:a="http://schemas.openxmlformats.org/drawingml/2006/main" xmlns:r="http://schemas.openxmlformats.org/officeDocument/2006/relationships" xmlns:p="http://schemas.openxmlformats.org/presentationml/2006/main">
+  <p:cSld>
+    <p:spTree>
+      <p:nvGrpSpPr>
+        <p:cNvPr id="1" name="Shape 212"/>
+        <p:cNvGrpSpPr/>
+        <p:nvPr/>
+      </p:nvGrpSpPr>
+      <p:grpSpPr>
+        <a:xfrm>
+          <a:off x="0" y="0"/>
+          <a:ext cx="0" cy="0"/>
+          <a:chOff x="0" y="0"/>
+          <a:chExt cx="0" cy="0"/>
+        </a:xfrm>
+      </p:grpSpPr>
+      <p:sp>
+        <p:nvSpPr>
+          <p:cNvPr id="213" name="Google Shape;213;p7"/>
+          <p:cNvSpPr txBox="1">
+            <a:spLocks noGrp="1"/>
+          </p:cNvSpPr>
+          <p:nvPr>
+            <p:ph type="title"/>
+          </p:nvPr>
+        </p:nvSpPr>
+        <p:spPr>
+          <a:xfrm>
+            <a:off x="626364" y="192024"/>
+            <a:ext cx="7891272" cy="457200"/>
+          </a:xfrm>
+          <a:prstGeom prst="rect">
+            <a:avLst/>
+          </a:prstGeom>
+          <a:noFill/>
+          <a:ln>
+            <a:noFill/>
+          </a:ln>
+        </p:spPr>
+        <p:txBody>
+          <a:bodyPr spcFirstLastPara="1" wrap="square" lIns="91425" tIns="45700" rIns="91425" bIns="45700" anchor="t" anchorCtr="0">
+            <a:noAutofit/>
+          </a:bodyPr>
+          <a:lstStyle/>
+          <a:p>
+            <a:pPr marL="0" lvl="0" indent="0" algn="ctr" rtl="0">
+              <a:lnSpc>
+                <a:spcPct val="100000"/>
+              </a:lnSpc>
+              <a:spcBef>
+                <a:spcPts val="0"/>
+              </a:spcBef>
+              <a:spcAft>
+                <a:spcPts val="0"/>
+              </a:spcAft>
+              <a:buClr>
+                <a:schemeClr val="dk2"/>
+              </a:buClr>
+              <a:buSzPts val="2700"/>
+              <a:buFont typeface="Trebuchet MS"/>
+              <a:buNone/>
+            </a:pPr>
+            <a:r>
+              <a:rPr lang="en-US" dirty="0"/>
+              <a:t>12.07 Demo</a:t>
+            </a:r>
+            <a:endParaRPr dirty="0"/>
+          </a:p>
+        </p:txBody>
+      </p:sp>
+      <p:sp>
+        <p:nvSpPr>
+          <p:cNvPr id="214" name="Google Shape;214;p7"/>
+          <p:cNvSpPr txBox="1">
+            <a:spLocks noGrp="1"/>
+          </p:cNvSpPr>
+          <p:nvPr>
+            <p:ph type="sldNum" idx="12"/>
+          </p:nvPr>
+        </p:nvSpPr>
+        <p:spPr>
+          <a:xfrm>
+            <a:off x="4114800" y="4754880"/>
+            <a:ext cx="914400" cy="230832"/>
+          </a:xfrm>
+          <a:prstGeom prst="rect">
+            <a:avLst/>
+          </a:prstGeom>
+          <a:noFill/>
+          <a:ln>
+            <a:noFill/>
+          </a:ln>
+        </p:spPr>
+        <p:txBody>
+          <a:bodyPr spcFirstLastPara="1" wrap="square" lIns="91425" tIns="45700" rIns="91425" bIns="45700" anchor="ctr" anchorCtr="0">
+            <a:noAutofit/>
+          </a:bodyPr>
+          <a:lstStyle/>
+          <a:p>
+            <a:pPr marL="0" lvl="0" indent="0" algn="r" rtl="0">
+              <a:spcBef>
+                <a:spcPts val="0"/>
+              </a:spcBef>
+              <a:spcAft>
+                <a:spcPts val="0"/>
+              </a:spcAft>
+              <a:buNone/>
+            </a:pPr>
+            <a:fld id="{00000000-1234-1234-1234-123412341234}" type="slidenum">
+              <a:rPr lang="en-US"/>
+              <a:t>21</a:t>
+            </a:fld>
+            <a:endParaRPr dirty="0"/>
+          </a:p>
+        </p:txBody>
+      </p:sp>
+      <p:sp>
+        <p:nvSpPr>
+          <p:cNvPr id="216" name="Google Shape;216;p7"/>
+          <p:cNvSpPr txBox="1"/>
+          <p:nvPr/>
+        </p:nvSpPr>
+        <p:spPr>
+          <a:xfrm>
+            <a:off x="626364" y="863100"/>
+            <a:ext cx="6472885" cy="369291"/>
+          </a:xfrm>
+          <a:prstGeom prst="rect">
+            <a:avLst/>
+          </a:prstGeom>
+          <a:noFill/>
+          <a:ln>
+            <a:noFill/>
+          </a:ln>
+        </p:spPr>
+        <p:txBody>
+          <a:bodyPr spcFirstLastPara="1" wrap="square" lIns="91425" tIns="45700" rIns="91425" bIns="45700" anchor="t" anchorCtr="0">
+            <a:spAutoFit/>
+          </a:bodyPr>
+          <a:lstStyle/>
+          <a:p>
+            <a:pPr marL="0" marR="0" lvl="0" indent="0" algn="l" rtl="0">
+              <a:spcBef>
+                <a:spcPts val="0"/>
+              </a:spcBef>
+              <a:spcAft>
+                <a:spcPts val="0"/>
+              </a:spcAft>
+              <a:buNone/>
+            </a:pPr>
+            <a:r>
+              <a:rPr lang="en-US" sz="1800" dirty="0">
+                <a:solidFill>
+                  <a:srgbClr val="6C911C"/>
+                </a:solidFill>
+                <a:latin typeface="Trebuchet MS"/>
+                <a:ea typeface="Trebuchet MS"/>
+                <a:cs typeface="Trebuchet MS"/>
+                <a:sym typeface="Trebuchet MS"/>
+              </a:rPr>
+              <a:t>Using “Selection Methods” to automatically select a model.</a:t>
+            </a:r>
+            <a:endParaRPr dirty="0"/>
+          </a:p>
+        </p:txBody>
+      </p:sp>
+      <p:sp>
+        <p:nvSpPr>
+          <p:cNvPr id="9" name="Google Shape;215;p7">
+            <a:extLst>
+              <a:ext uri="{FF2B5EF4-FFF2-40B4-BE49-F238E27FC236}">
+                <a16:creationId xmlns:a16="http://schemas.microsoft.com/office/drawing/2014/main" id="{EF8131F3-0569-45B1-A461-4A3E1B05948E}"/>
+              </a:ext>
+            </a:extLst>
+          </p:cNvPr>
+          <p:cNvSpPr txBox="1">
+            <a:spLocks noGrp="1"/>
+          </p:cNvSpPr>
+          <p:nvPr>
+            <p:ph type="body" idx="1"/>
+          </p:nvPr>
+        </p:nvSpPr>
+        <p:spPr>
+          <a:xfrm>
+            <a:off x="380762" y="1815560"/>
+            <a:ext cx="6648703" cy="3170152"/>
+          </a:xfrm>
+          <a:prstGeom prst="rect">
+            <a:avLst/>
+          </a:prstGeom>
+          <a:noFill/>
+          <a:ln>
+            <a:noFill/>
+          </a:ln>
+        </p:spPr>
+        <p:txBody>
+          <a:bodyPr spcFirstLastPara="1" wrap="square" lIns="0" tIns="0" rIns="0" bIns="0" anchor="t" anchorCtr="0">
+            <a:noAutofit/>
+          </a:bodyPr>
+          <a:lstStyle/>
+          <a:p>
+            <a:pPr marL="457200" lvl="0" indent="-457200" algn="l" rtl="0">
+              <a:spcBef>
+                <a:spcPts val="750"/>
+              </a:spcBef>
+              <a:spcAft>
+                <a:spcPts val="0"/>
+              </a:spcAft>
+              <a:buClr>
+                <a:srgbClr val="3F3F3F"/>
+              </a:buClr>
+              <a:buSzPts val="1300"/>
+              <a:buFont typeface="Trebuchet MS"/>
+              <a:buAutoNum type="arabicPeriod"/>
+            </a:pPr>
+            <a:r>
+              <a:rPr lang="en-US" dirty="0"/>
+              <a:t>Use the same task as in 12.06. </a:t>
+            </a:r>
+            <a:endParaRPr dirty="0"/>
+          </a:p>
+          <a:p>
+            <a:pPr marL="457200" lvl="0" indent="-457200" algn="l" rtl="0">
+              <a:spcBef>
+                <a:spcPts val="750"/>
+              </a:spcBef>
+              <a:spcAft>
+                <a:spcPts val="0"/>
+              </a:spcAft>
+              <a:buClr>
+                <a:srgbClr val="3F3F3F"/>
+              </a:buClr>
+              <a:buSzPts val="1300"/>
+              <a:buFont typeface="Trebuchet MS"/>
+              <a:buAutoNum type="arabicPeriod"/>
+            </a:pPr>
+            <a:r>
+              <a:rPr lang="en-US" dirty="0"/>
+              <a:t>On the </a:t>
+            </a:r>
+            <a:r>
+              <a:rPr lang="en-US" b="1" dirty="0"/>
+              <a:t>SELECTION </a:t>
+            </a:r>
+            <a:r>
+              <a:rPr lang="en-US" dirty="0"/>
+              <a:t>tab under Settings, select </a:t>
+            </a:r>
+            <a:r>
+              <a:rPr lang="en-US" b="1" dirty="0"/>
+              <a:t>Stepwise selection</a:t>
+            </a:r>
+            <a:r>
+              <a:rPr lang="en-US" dirty="0"/>
+              <a:t> for the </a:t>
+            </a:r>
+            <a:r>
+              <a:rPr lang="en-US" b="1" dirty="0"/>
+              <a:t>Selection method.</a:t>
+            </a:r>
+            <a:endParaRPr lang="en-US" dirty="0"/>
+          </a:p>
+          <a:p>
+            <a:pPr marL="457200" lvl="0" indent="-457200" algn="l" rtl="0">
+              <a:spcBef>
+                <a:spcPts val="750"/>
+              </a:spcBef>
+              <a:spcAft>
+                <a:spcPts val="0"/>
+              </a:spcAft>
+              <a:buClr>
+                <a:srgbClr val="3F3F3F"/>
+              </a:buClr>
+              <a:buSzPts val="1300"/>
+              <a:buFont typeface="Trebuchet MS"/>
+              <a:buAutoNum type="arabicPeriod"/>
+            </a:pPr>
+            <a:r>
+              <a:rPr lang="en-US" dirty="0"/>
+              <a:t>On the </a:t>
+            </a:r>
+            <a:r>
+              <a:rPr lang="en-US" b="1" dirty="0"/>
+              <a:t>OPTIONS</a:t>
+            </a:r>
+            <a:r>
+              <a:rPr lang="en-US" dirty="0"/>
+              <a:t> tab, expand </a:t>
+            </a:r>
+            <a:r>
+              <a:rPr lang="en-US" b="1" dirty="0"/>
+              <a:t>STATISTICS</a:t>
+            </a:r>
+            <a:r>
+              <a:rPr lang="en-US" dirty="0"/>
+              <a:t> select </a:t>
+            </a:r>
+            <a:r>
+              <a:rPr lang="en-US" b="1" dirty="0"/>
+              <a:t>Default and selected statistics</a:t>
+            </a:r>
+            <a:r>
+              <a:rPr lang="en-US" dirty="0"/>
+              <a:t> and expand </a:t>
+            </a:r>
+            <a:r>
+              <a:rPr lang="en-US" b="1" dirty="0"/>
+              <a:t>Collinearity</a:t>
+            </a:r>
+            <a:r>
+              <a:rPr lang="en-US" dirty="0"/>
+              <a:t> then check </a:t>
+            </a:r>
+            <a:r>
+              <a:rPr lang="en-US" b="1" dirty="0"/>
+              <a:t>Variance inflation factors</a:t>
+            </a:r>
+          </a:p>
+          <a:p>
+            <a:pPr marL="457200" lvl="0" indent="-457200" algn="l" rtl="0">
+              <a:spcBef>
+                <a:spcPts val="750"/>
+              </a:spcBef>
+              <a:spcAft>
+                <a:spcPts val="0"/>
+              </a:spcAft>
+              <a:buClr>
+                <a:srgbClr val="3F3F3F"/>
+              </a:buClr>
+              <a:buSzPts val="1300"/>
+              <a:buFont typeface="Trebuchet MS"/>
+              <a:buAutoNum type="arabicPeriod"/>
+            </a:pPr>
+            <a:r>
+              <a:rPr lang="en-US" dirty="0"/>
+              <a:t>Keep all other settings under </a:t>
+            </a:r>
+            <a:r>
+              <a:rPr lang="en-US" b="1" dirty="0"/>
+              <a:t>Selection method</a:t>
+            </a:r>
+            <a:r>
+              <a:rPr lang="en-US" dirty="0"/>
+              <a:t> as the defaults.</a:t>
+            </a:r>
+          </a:p>
+          <a:p>
+            <a:pPr marL="457200" lvl="0" indent="-457200" algn="l" rtl="0">
+              <a:spcBef>
+                <a:spcPts val="750"/>
+              </a:spcBef>
+              <a:spcAft>
+                <a:spcPts val="0"/>
+              </a:spcAft>
+              <a:buClr>
+                <a:srgbClr val="3F3F3F"/>
+              </a:buClr>
+              <a:buSzPts val="1300"/>
+              <a:buFont typeface="Trebuchet MS"/>
+              <a:buAutoNum type="arabicPeriod"/>
+            </a:pPr>
+            <a:r>
+              <a:rPr lang="en-US" dirty="0"/>
+              <a:t>Select the Running Icon</a:t>
+            </a:r>
+            <a:endParaRPr dirty="0"/>
+          </a:p>
+        </p:txBody>
+      </p:sp>
+    </p:spTree>
+    <p:extLst>
+      <p:ext uri="{BB962C8B-B14F-4D97-AF65-F5344CB8AC3E}">
+        <p14:creationId xmlns:p14="http://schemas.microsoft.com/office/powerpoint/2010/main" val="4163742827"/>
+      </p:ext>
+    </p:extLst>
+  </p:cSld>
+  <p:clrMapOvr>
+    <a:masterClrMapping/>
+  </p:clrMapOvr>
+</p:sld>
+</file>
+
+<file path=ppt/slides/slide22.xml><?xml version="1.0" encoding="utf-8"?>
+<p:sld xmlns:a="http://schemas.openxmlformats.org/drawingml/2006/main" xmlns:r="http://schemas.openxmlformats.org/officeDocument/2006/relationships" xmlns:p="http://schemas.openxmlformats.org/presentationml/2006/main">
+  <p:cSld>
+    <p:spTree>
+      <p:nvGrpSpPr>
+        <p:cNvPr id="1" name=""/>
+        <p:cNvGrpSpPr/>
+        <p:nvPr/>
+      </p:nvGrpSpPr>
+      <p:grpSpPr>
+        <a:xfrm>
+          <a:off x="0" y="0"/>
+          <a:ext cx="0" cy="0"/>
+          <a:chOff x="0" y="0"/>
+          <a:chExt cx="0" cy="0"/>
+        </a:xfrm>
+      </p:grpSpPr>
+      <p:sp>
+        <p:nvSpPr>
+          <p:cNvPr id="2" name="Title 1">
+            <a:extLst>
+              <a:ext uri="{FF2B5EF4-FFF2-40B4-BE49-F238E27FC236}">
+                <a16:creationId xmlns:a16="http://schemas.microsoft.com/office/drawing/2014/main" id="{C0F2E4F0-984F-4C05-BCBF-9BFCD458FBE1}"/>
+              </a:ext>
+            </a:extLst>
+          </p:cNvPr>
+          <p:cNvSpPr>
+            <a:spLocks noGrp="1"/>
+          </p:cNvSpPr>
+          <p:nvPr>
+            <p:ph type="title"/>
+          </p:nvPr>
+        </p:nvSpPr>
+        <p:spPr>
+          <a:xfrm>
+            <a:off x="113120" y="169624"/>
+            <a:ext cx="7891272" cy="457200"/>
+          </a:xfrm>
+        </p:spPr>
+        <p:txBody>
+          <a:bodyPr/>
+          <a:lstStyle/>
+          <a:p>
+            <a:r>
+              <a:rPr lang="en-US" dirty="0"/>
+              <a:t>Stepwise Select Method Results</a:t>
+            </a:r>
+          </a:p>
+        </p:txBody>
+      </p:sp>
+      <p:pic>
+        <p:nvPicPr>
+          <p:cNvPr id="4" name="Picture 3" descr="A picture containing diagram&#10;&#10;Description automatically generated">
+            <a:extLst>
+              <a:ext uri="{FF2B5EF4-FFF2-40B4-BE49-F238E27FC236}">
+                <a16:creationId xmlns:a16="http://schemas.microsoft.com/office/drawing/2014/main" id="{9E259FC1-85AB-5C49-8F45-04B15BFFF283}"/>
+              </a:ext>
+            </a:extLst>
+          </p:cNvPr>
+          <p:cNvPicPr>
+            <a:picLocks noChangeAspect="1"/>
+          </p:cNvPicPr>
+          <p:nvPr/>
+        </p:nvPicPr>
+        <p:blipFill>
+          <a:blip r:embed="rId2"/>
+          <a:stretch>
+            <a:fillRect/>
+          </a:stretch>
+        </p:blipFill>
+        <p:spPr>
+          <a:xfrm>
+            <a:off x="899286" y="626824"/>
+            <a:ext cx="2766269" cy="4418604"/>
+          </a:xfrm>
+          <a:prstGeom prst="rect">
+            <a:avLst/>
+          </a:prstGeom>
+        </p:spPr>
+      </p:pic>
+      <p:sp>
+        <p:nvSpPr>
+          <p:cNvPr id="8" name="TextBox 7">
+            <a:extLst>
+              <a:ext uri="{FF2B5EF4-FFF2-40B4-BE49-F238E27FC236}">
+                <a16:creationId xmlns:a16="http://schemas.microsoft.com/office/drawing/2014/main" id="{A59F1B7C-1F37-AB49-A6F6-2DEECCDAB2D0}"/>
+              </a:ext>
+            </a:extLst>
+          </p:cNvPr>
+          <p:cNvSpPr txBox="1"/>
+          <p:nvPr/>
+        </p:nvSpPr>
+        <p:spPr>
+          <a:xfrm>
+            <a:off x="4451721" y="1775901"/>
+            <a:ext cx="2516489" cy="738664"/>
+          </a:xfrm>
+          <a:prstGeom prst="rect">
+            <a:avLst/>
+          </a:prstGeom>
+          <a:noFill/>
+        </p:spPr>
+        <p:txBody>
+          <a:bodyPr wrap="square" rtlCol="0">
+            <a:spAutoFit/>
+          </a:bodyPr>
+          <a:lstStyle/>
+          <a:p>
+            <a:r>
+              <a:rPr lang="en-US" dirty="0"/>
+              <a:t>Optimal model according to SBC achieved after adding Flexibility</a:t>
+            </a:r>
+          </a:p>
+        </p:txBody>
+      </p:sp>
+      <p:cxnSp>
+        <p:nvCxnSpPr>
+          <p:cNvPr id="10" name="Straight Arrow Connector 9">
+            <a:extLst>
+              <a:ext uri="{FF2B5EF4-FFF2-40B4-BE49-F238E27FC236}">
+                <a16:creationId xmlns:a16="http://schemas.microsoft.com/office/drawing/2014/main" id="{E0DAFA30-0DE4-1440-A01A-64B8D9C74B2A}"/>
+              </a:ext>
+            </a:extLst>
+          </p:cNvPr>
+          <p:cNvCxnSpPr>
+            <a:cxnSpLocks/>
+            <a:stCxn id="8" idx="1"/>
+          </p:cNvCxnSpPr>
+          <p:nvPr/>
+        </p:nvCxnSpPr>
+        <p:spPr>
+          <a:xfrm flipH="1">
+            <a:off x="2841441" y="2145233"/>
+            <a:ext cx="1610280" cy="76532"/>
+          </a:xfrm>
+          <a:prstGeom prst="straightConnector1">
+            <a:avLst/>
+          </a:prstGeom>
+          <a:ln>
+            <a:tailEnd type="triangle"/>
+          </a:ln>
+        </p:spPr>
+        <p:style>
+          <a:lnRef idx="1">
+            <a:schemeClr val="accent1"/>
+          </a:lnRef>
+          <a:fillRef idx="0">
+            <a:schemeClr val="accent1"/>
+          </a:fillRef>
+          <a:effectRef idx="0">
+            <a:schemeClr val="accent1"/>
+          </a:effectRef>
+          <a:fontRef idx="minor">
+            <a:schemeClr val="tx1"/>
+          </a:fontRef>
+        </p:style>
+      </p:cxnSp>
+    </p:spTree>
+    <p:extLst>
+      <p:ext uri="{BB962C8B-B14F-4D97-AF65-F5344CB8AC3E}">
+        <p14:creationId xmlns:p14="http://schemas.microsoft.com/office/powerpoint/2010/main" val="4094826215"/>
+      </p:ext>
+    </p:extLst>
+  </p:cSld>
+  <p:clrMapOvr>
+    <a:masterClrMapping/>
+  </p:clrMapOvr>
+</p:sld>
+</file>
+
+<file path=ppt/slides/slide23.xml><?xml version="1.0" encoding="utf-8"?>
 <p:sld xmlns:a="http://schemas.openxmlformats.org/drawingml/2006/main" xmlns:r="http://schemas.openxmlformats.org/officeDocument/2006/relationships" xmlns:p="http://schemas.openxmlformats.org/presentationml/2006/main">
   <p:cSld>
     <p:spTree>
@@ -30147,11 +30885,9 @@
                 </a:endParaRPr>
               </a:p>
               <a:p>
-                <a:pPr/>
                 <a:endParaRPr lang="en-US" sz="1600" b="1" dirty="0"/>
               </a:p>
               <a:p>
-                <a:pPr/>
                 <a:r>
                   <a:rPr lang="en-US" sz="1600" b="1" dirty="0"/>
                   <a:t>We want to estimate the parameters (</a:t>

</xml_diff>